<commit_message>
add social media handle
</commit_message>
<xml_diff>
--- a/resources/reactive_python_slides_v2.pptx
+++ b/resources/reactive_python_slides_v2.pptx
@@ -247,7 +247,7 @@
           <a:p>
             <a:fld id="{D68E09DD-A271-4E46-9B09-7316EE422583}" type="datetimeFigureOut">
               <a:rPr lang="en-US"/>
-              <a:t>8/27/2017</a:t>
+              <a:t>10/19/2017</a:t>
             </a:fld>
             <a:endParaRPr lang="en-US"/>
           </a:p>
@@ -908,7 +908,7 @@
           <a:p>
             <a:fld id="{4BDF68E2-58F2-4D09-BE8B-E3BD06533059}" type="datetimeFigureOut">
               <a:rPr lang="en-US" dirty="0"/>
-              <a:t>8/27/2017</a:t>
+              <a:t>10/19/2017</a:t>
             </a:fld>
             <a:endParaRPr lang="en-US" dirty="0"/>
           </a:p>
@@ -1111,7 +1111,7 @@
           <a:p>
             <a:fld id="{2E2D6473-DF6D-4702-B328-E0DD40540A4E}" type="datetimeFigureOut">
               <a:rPr lang="en-US" dirty="0"/>
-              <a:t>8/27/2017</a:t>
+              <a:t>10/19/2017</a:t>
             </a:fld>
             <a:endParaRPr lang="en-US" dirty="0"/>
           </a:p>
@@ -1362,7 +1362,7 @@
           <a:p>
             <a:fld id="{E26F7E3A-B166-407D-9866-32884E7D5B37}" type="datetimeFigureOut">
               <a:rPr lang="en-US" dirty="0"/>
-              <a:t>8/27/2017</a:t>
+              <a:t>10/19/2017</a:t>
             </a:fld>
             <a:endParaRPr lang="en-US" dirty="0"/>
           </a:p>
@@ -1531,7 +1531,7 @@
           <a:p>
             <a:fld id="{528FC5F6-F338-4AE4-BB23-26385BCFC423}" type="datetimeFigureOut">
               <a:rPr lang="en-US" dirty="0"/>
-              <a:t>8/27/2017</a:t>
+              <a:t>10/19/2017</a:t>
             </a:fld>
             <a:endParaRPr lang="en-US" dirty="0"/>
           </a:p>
@@ -1869,7 +1869,7 @@
           <a:p>
             <a:fld id="{20EBB0C4-6273-4C6E-B9BD-2EDC30F1CD52}" type="datetimeFigureOut">
               <a:rPr lang="en-US" dirty="0"/>
-              <a:t>8/27/2017</a:t>
+              <a:t>10/19/2017</a:t>
             </a:fld>
             <a:endParaRPr lang="en-US" dirty="0"/>
           </a:p>
@@ -2139,7 +2139,7 @@
           <a:p>
             <a:fld id="{19AB4D41-86C1-4908-B66A-0B50CEB3BF29}" type="datetimeFigureOut">
               <a:rPr lang="en-US" dirty="0"/>
-              <a:t>8/27/2017</a:t>
+              <a:t>10/19/2017</a:t>
             </a:fld>
             <a:endParaRPr lang="en-US" dirty="0"/>
           </a:p>
@@ -2513,7 +2513,7 @@
           <a:p>
             <a:fld id="{E6426E2C-56C1-4E0D-A793-0088A7FDD37E}" type="datetimeFigureOut">
               <a:rPr lang="en-US" dirty="0"/>
-              <a:t>8/27/2017</a:t>
+              <a:t>10/19/2017</a:t>
             </a:fld>
             <a:endParaRPr lang="en-US" dirty="0"/>
           </a:p>
@@ -2626,7 +2626,7 @@
           <a:p>
             <a:fld id="{C8C39B41-D8B5-4052-B551-9B5525EAA8B6}" type="datetimeFigureOut">
               <a:rPr lang="en-US" dirty="0"/>
-              <a:t>8/27/2017</a:t>
+              <a:t>10/19/2017</a:t>
             </a:fld>
             <a:endParaRPr lang="en-US" dirty="0"/>
           </a:p>
@@ -2792,7 +2792,7 @@
           <a:p>
             <a:fld id="{4D94136C-8742-45B2-AF27-D93DF72833A9}" type="datetimeFigureOut">
               <a:rPr lang="en-US" dirty="0"/>
-              <a:t>8/27/2017</a:t>
+              <a:t>10/19/2017</a:t>
             </a:fld>
             <a:endParaRPr lang="en-US" dirty="0"/>
           </a:p>
@@ -3142,7 +3142,7 @@
           <a:p>
             <a:fld id="{32ABBEA6-7C60-4B02-AE87-00D78D8422AF}" type="datetimeFigureOut">
               <a:rPr lang="en-US" dirty="0"/>
-              <a:t>8/27/2017</a:t>
+              <a:t>10/19/2017</a:t>
             </a:fld>
             <a:endParaRPr lang="en-US" dirty="0"/>
           </a:p>
@@ -3517,7 +3517,7 @@
           <a:p>
             <a:fld id="{C9CAD897-D46E-4AD2-BD9B-49DD3E640873}" type="datetimeFigureOut">
               <a:rPr lang="en-US" dirty="0"/>
-              <a:t>8/27/2017</a:t>
+              <a:t>10/19/2017</a:t>
             </a:fld>
             <a:endParaRPr lang="en-US" dirty="0"/>
           </a:p>
@@ -3799,7 +3799,7 @@
           <a:p>
             <a:fld id="{98624D31-43A5-475A-80CF-332C9F6DCF35}" type="datetimeFigureOut">
               <a:rPr lang="en-US" dirty="0"/>
-              <a:t>8/27/2017</a:t>
+              <a:t>10/19/2017</a:t>
             </a:fld>
             <a:endParaRPr lang="en-US" dirty="0"/>
           </a:p>
@@ -12445,6 +12445,147 @@
           </a:p>
         </p:txBody>
       </p:sp>
+      <p:sp>
+        <p:nvSpPr>
+          <p:cNvPr id="4" name="TextBox 3">
+            <a:extLst>
+              <a:ext uri="{FF2B5EF4-FFF2-40B4-BE49-F238E27FC236}">
+                <a16:creationId xmlns:a16="http://schemas.microsoft.com/office/drawing/2014/main" id="{E41AFB01-20E3-4C03-AACC-26C0D35C2433}"/>
+              </a:ext>
+            </a:extLst>
+          </p:cNvPr>
+          <p:cNvSpPr txBox="1"/>
+          <p:nvPr/>
+        </p:nvSpPr>
+        <p:spPr>
+          <a:xfrm>
+            <a:off x="8754841" y="5092061"/>
+            <a:ext cx="2368061" cy="369332"/>
+          </a:xfrm>
+          <a:prstGeom prst="rect">
+            <a:avLst/>
+          </a:prstGeom>
+          <a:noFill/>
+        </p:spPr>
+        <p:txBody>
+          <a:bodyPr wrap="square" rtlCol="0">
+            <a:spAutoFit/>
+          </a:bodyPr>
+          <a:lstStyle/>
+          <a:p>
+            <a:r>
+              <a:rPr lang="en-US" dirty="0"/>
+              <a:t>thomasnield9727	</a:t>
+            </a:r>
+          </a:p>
+        </p:txBody>
+      </p:sp>
+      <p:pic>
+        <p:nvPicPr>
+          <p:cNvPr id="5" name="Picture 4">
+            <a:extLst>
+              <a:ext uri="{FF2B5EF4-FFF2-40B4-BE49-F238E27FC236}">
+                <a16:creationId xmlns:a16="http://schemas.microsoft.com/office/drawing/2014/main" id="{6E2A5F34-334D-4E4A-9BC7-EEB419CA1B92}"/>
+              </a:ext>
+            </a:extLst>
+          </p:cNvPr>
+          <p:cNvPicPr>
+            <a:picLocks noChangeAspect="1"/>
+          </p:cNvPicPr>
+          <p:nvPr/>
+        </p:nvPicPr>
+        <p:blipFill>
+          <a:blip r:embed="rId3">
+            <a:extLst>
+              <a:ext uri="{28A0092B-C50C-407E-A947-70E740481C1C}">
+                <a14:useLocalDpi xmlns:a14="http://schemas.microsoft.com/office/drawing/2010/main" val="0"/>
+              </a:ext>
+            </a:extLst>
+          </a:blip>
+          <a:stretch>
+            <a:fillRect/>
+          </a:stretch>
+        </p:blipFill>
+        <p:spPr>
+          <a:xfrm>
+            <a:off x="8357023" y="5092061"/>
+            <a:ext cx="397818" cy="397818"/>
+          </a:xfrm>
+          <a:prstGeom prst="rect">
+            <a:avLst/>
+          </a:prstGeom>
+        </p:spPr>
+      </p:pic>
+      <p:sp>
+        <p:nvSpPr>
+          <p:cNvPr id="6" name="Rectangle 5">
+            <a:extLst>
+              <a:ext uri="{FF2B5EF4-FFF2-40B4-BE49-F238E27FC236}">
+                <a16:creationId xmlns:a16="http://schemas.microsoft.com/office/drawing/2014/main" id="{13E4846F-6BEA-4A66-815D-232B560B11AD}"/>
+              </a:ext>
+            </a:extLst>
+          </p:cNvPr>
+          <p:cNvSpPr/>
+          <p:nvPr/>
+        </p:nvSpPr>
+        <p:spPr>
+          <a:xfrm>
+            <a:off x="8754841" y="5582774"/>
+            <a:ext cx="3437159" cy="369332"/>
+          </a:xfrm>
+          <a:prstGeom prst="rect">
+            <a:avLst/>
+          </a:prstGeom>
+        </p:spPr>
+        <p:txBody>
+          <a:bodyPr wrap="none">
+            <a:spAutoFit/>
+          </a:bodyPr>
+          <a:lstStyle/>
+          <a:p>
+            <a:r>
+              <a:rPr lang="en-US" dirty="0"/>
+              <a:t>https://github.com/thomasnield</a:t>
+            </a:r>
+          </a:p>
+        </p:txBody>
+      </p:sp>
+      <p:pic>
+        <p:nvPicPr>
+          <p:cNvPr id="7" name="Picture 6">
+            <a:extLst>
+              <a:ext uri="{FF2B5EF4-FFF2-40B4-BE49-F238E27FC236}">
+                <a16:creationId xmlns:a16="http://schemas.microsoft.com/office/drawing/2014/main" id="{F0BD378F-67B6-4999-9D95-9E3975DE3ECD}"/>
+              </a:ext>
+            </a:extLst>
+          </p:cNvPr>
+          <p:cNvPicPr>
+            <a:picLocks noChangeAspect="1"/>
+          </p:cNvPicPr>
+          <p:nvPr/>
+        </p:nvPicPr>
+        <p:blipFill>
+          <a:blip r:embed="rId4">
+            <a:extLst>
+              <a:ext uri="{28A0092B-C50C-407E-A947-70E740481C1C}">
+                <a14:useLocalDpi xmlns:a14="http://schemas.microsoft.com/office/drawing/2010/main" val="0"/>
+              </a:ext>
+            </a:extLst>
+          </a:blip>
+          <a:stretch>
+            <a:fillRect/>
+          </a:stretch>
+        </p:blipFill>
+        <p:spPr>
+          <a:xfrm>
+            <a:off x="8357023" y="5579650"/>
+            <a:ext cx="397818" cy="397818"/>
+          </a:xfrm>
+          <a:prstGeom prst="rect">
+            <a:avLst/>
+          </a:prstGeom>
+        </p:spPr>
+      </p:pic>
     </p:spTree>
     <p:extLst>
       <p:ext uri="{BB962C8B-B14F-4D97-AF65-F5344CB8AC3E}">

</xml_diff>